<commit_message>
Moved revised files to right location
</commit_message>
<xml_diff>
--- a/en/ProgrammingLessons/SoftwareandFirmware.pptx
+++ b/en/ProgrammingLessons/SoftwareandFirmware.pptx
@@ -220,7 +220,7 @@
           <a:p>
             <a:fld id="{58040048-1E4D-CD41-AC49-0750EB72586B}" type="datetimeFigureOut">
               <a:rPr lang="en-US" smtClean="0"/>
-              <a:t>12/17/20</a:t>
+              <a:t>5/11/23</a:t>
             </a:fld>
             <a:endParaRPr lang="en-US"/>
           </a:p>
@@ -386,7 +386,7 @@
           <a:p>
             <a:fld id="{2B8484CF-5098-F24E-8881-583515D5C406}" type="datetimeFigureOut">
               <a:rPr lang="en-US" smtClean="0"/>
-              <a:t>12/17/20</a:t>
+              <a:t>5/11/23</a:t>
             </a:fld>
             <a:endParaRPr lang="en-US"/>
           </a:p>
@@ -1665,7 +1665,7 @@
           <a:p>
             <a:r>
               <a:rPr lang="en-US"/>
-              <a:t>Copyright © 2020 Prime Lessons (primelessons.org) CC-BY-NC-SA.  (Last edit: 12/14/2020)</a:t>
+              <a:t>Copyright © 2023 Prime Lessons (primelessons.org) CC-BY-NC-SA.  (Last edit: 05/11/2023)</a:t>
             </a:r>
             <a:endParaRPr lang="en-US" dirty="0"/>
           </a:p>
@@ -1919,7 +1919,7 @@
           <a:p>
             <a:r>
               <a:rPr lang="en-US"/>
-              <a:t>Copyright © 2020 Prime Lessons (primelessons.org) CC-BY-NC-SA.  (Last edit: 12/14/2020)</a:t>
+              <a:t>Copyright © 2023 Prime Lessons (primelessons.org) CC-BY-NC-SA.  (Last edit: 05/11/2023)</a:t>
             </a:r>
             <a:endParaRPr lang="en-US" dirty="0"/>
           </a:p>
@@ -2178,7 +2178,7 @@
           <a:p>
             <a:r>
               <a:rPr lang="en-US"/>
-              <a:t>Copyright © 2020 Prime Lessons (primelessons.org) CC-BY-NC-SA.  (Last edit: 12/14/2020)</a:t>
+              <a:t>Copyright © 2023 Prime Lessons (primelessons.org) CC-BY-NC-SA.  (Last edit: 05/11/2023)</a:t>
             </a:r>
             <a:endParaRPr lang="en-US" dirty="0"/>
           </a:p>
@@ -2692,7 +2692,7 @@
           <a:p>
             <a:r>
               <a:rPr lang="en-US"/>
-              <a:t>Copyright © 2020 Prime Lessons (primelessons.org) CC-BY-NC-SA.  (Last edit: 12/14/2020)</a:t>
+              <a:t>Copyright © 2023 Prime Lessons (primelessons.org) CC-BY-NC-SA.  (Last edit: 05/11/2023)</a:t>
             </a:r>
             <a:endParaRPr lang="en-US" dirty="0"/>
           </a:p>
@@ -2883,7 +2883,7 @@
           <a:p>
             <a:r>
               <a:rPr lang="en-US"/>
-              <a:t>Copyright © 2020 Prime Lessons (primelessons.org) CC-BY-NC-SA.  (Last edit: 12/14/2020)</a:t>
+              <a:t>Copyright © 2023 Prime Lessons (primelessons.org) CC-BY-NC-SA.  (Last edit: 05/11/2023)</a:t>
             </a:r>
             <a:endParaRPr lang="en-US" dirty="0"/>
           </a:p>
@@ -3282,7 +3282,7 @@
           <a:p>
             <a:r>
               <a:rPr lang="en-US"/>
-              <a:t>Copyright © 2020 Prime Lessons (primelessons.org) CC-BY-NC-SA.  (Last edit: 12/14/2020)</a:t>
+              <a:t>Copyright © 2023 Prime Lessons (primelessons.org) CC-BY-NC-SA.  (Last edit: 05/11/2023)</a:t>
             </a:r>
             <a:endParaRPr lang="en-US" dirty="0"/>
           </a:p>
@@ -3486,7 +3486,7 @@
           <a:p>
             <a:r>
               <a:rPr lang="en-US"/>
-              <a:t>Copyright © 2020 Prime Lessons (primelessons.org) CC-BY-NC-SA.  (Last edit: 12/14/2020)</a:t>
+              <a:t>Copyright © 2023 Prime Lessons (primelessons.org) CC-BY-NC-SA.  (Last edit: 05/11/2023)</a:t>
             </a:r>
             <a:endParaRPr lang="en-US" dirty="0"/>
           </a:p>
@@ -3895,7 +3895,7 @@
           <a:p>
             <a:r>
               <a:rPr lang="en-US"/>
-              <a:t>Copyright © 2020 Prime Lessons (primelessons.org) CC-BY-NC-SA.  (Last edit: 12/14/2020)</a:t>
+              <a:t>Copyright © 2023 Prime Lessons (primelessons.org) CC-BY-NC-SA.  (Last edit: 05/11/2023)</a:t>
             </a:r>
             <a:endParaRPr lang="en-US" dirty="0"/>
           </a:p>
@@ -4474,7 +4474,7 @@
           <a:p>
             <a:r>
               <a:rPr lang="en-US"/>
-              <a:t>Copyright © 2020 Prime Lessons (primelessons.org) CC-BY-NC-SA.  (Last edit: 12/14/2020)</a:t>
+              <a:t>Copyright © 2023 Prime Lessons (primelessons.org) CC-BY-NC-SA.  (Last edit: 05/11/2023)</a:t>
             </a:r>
             <a:endParaRPr lang="en-US" dirty="0"/>
           </a:p>
@@ -5077,7 +5077,7 @@
           <a:p>
             <a:r>
               <a:rPr lang="en-US"/>
-              <a:t>Copyright © 2020 Prime Lessons (primelessons.org) CC-BY-NC-SA.  (Last edit: 12/14/2020)</a:t>
+              <a:t>Copyright © 2023 Prime Lessons (primelessons.org) CC-BY-NC-SA.  (Last edit: 05/11/2023)</a:t>
             </a:r>
             <a:endParaRPr lang="en-US" dirty="0"/>
           </a:p>
@@ -5321,7 +5321,7 @@
           <a:p>
             <a:r>
               <a:rPr lang="en-US"/>
-              <a:t>Copyright © 2020 Prime Lessons (primelessons.org) CC-BY-NC-SA.  (Last edit: 12/14/2020)</a:t>
+              <a:t>Copyright © 2023 Prime Lessons (primelessons.org) CC-BY-NC-SA.  (Last edit: 05/11/2023)</a:t>
             </a:r>
             <a:endParaRPr lang="en-US" dirty="0"/>
           </a:p>
@@ -5810,7 +5810,7 @@
           <a:p>
             <a:r>
               <a:rPr lang="en-US"/>
-              <a:t>Copyright © 2020 Prime Lessons (primelessons.org) CC-BY-NC-SA.  (Last edit: 12/14/2020)</a:t>
+              <a:t>Copyright © 2023 Prime Lessons (primelessons.org) CC-BY-NC-SA.  (Last edit: 05/11/2023)</a:t>
             </a:r>
             <a:endParaRPr lang="en-US" dirty="0"/>
           </a:p>
@@ -6280,7 +6280,7 @@
           <a:p>
             <a:r>
               <a:rPr lang="en-US"/>
-              <a:t>Copyright © 2020 Prime Lessons (primelessons.org) CC-BY-NC-SA.  (Last edit: 12/14/2020)</a:t>
+              <a:t>Copyright © 2023 Prime Lessons (primelessons.org) CC-BY-NC-SA.  (Last edit: 05/11/2023)</a:t>
             </a:r>
           </a:p>
         </p:txBody>
@@ -6581,7 +6581,7 @@
           <a:p>
             <a:r>
               <a:rPr lang="en-US"/>
-              <a:t>Copyright © 2020 Prime Lessons (primelessons.org) CC-BY-NC-SA.  (Last edit: 12/14/2020)</a:t>
+              <a:t>Copyright © 2023 Prime Lessons (primelessons.org) CC-BY-NC-SA.  (Last edit: 05/11/2023)</a:t>
             </a:r>
             <a:endParaRPr lang="en-US" dirty="0"/>
           </a:p>
@@ -6901,7 +6901,7 @@
           <a:p>
             <a:r>
               <a:rPr lang="en-US"/>
-              <a:t>Copyright © 2020 Prime Lessons (primelessons.org) CC-BY-NC-SA.  (Last edit: 12/14/2020)</a:t>
+              <a:t>Copyright © 2023 Prime Lessons (primelessons.org) CC-BY-NC-SA.  (Last edit: 05/11/2023)</a:t>
             </a:r>
             <a:endParaRPr lang="en-US" dirty="0"/>
           </a:p>
@@ -7601,7 +7601,7 @@
           <a:p>
             <a:r>
               <a:rPr lang="en-US"/>
-              <a:t>Copyright © 2020 Prime Lessons (primelessons.org) CC-BY-NC-SA.  (Last edit: 12/14/2020)</a:t>
+              <a:t>Copyright © 2023 Prime Lessons (primelessons.org) CC-BY-NC-SA.  (Last edit: 05/11/2023)</a:t>
             </a:r>
             <a:endParaRPr lang="en-US" dirty="0"/>
           </a:p>
@@ -7661,7 +7661,7 @@
           <a:effectLst/>
           <a:extLst>
             <a:ext uri="{91240B29-F687-4f45-9708-019B960494DF}">
-              <a14:hiddenLine xmlns:a14="http://schemas.microsoft.com/office/drawing/2010/main" xmlns="" w="9525">
+              <a14:hiddenLine xmlns="" xmlns:a14="http://schemas.microsoft.com/office/drawing/2010/main" w="9525">
                 <a:solidFill>
                   <a:schemeClr val="tx1"/>
                 </a:solidFill>
@@ -7671,7 +7671,7 @@
               </a14:hiddenLine>
             </a:ext>
             <a:ext uri="{AF507438-7753-43e0-B8FC-AC1667EBCBE1}">
-              <a14:hiddenEffects xmlns:a14="http://schemas.microsoft.com/office/drawing/2010/main" xmlns="">
+              <a14:hiddenEffects xmlns="" xmlns:a14="http://schemas.microsoft.com/office/drawing/2010/main">
                 <a:effectLst>
                   <a:outerShdw dist="35921" dir="2700000" algn="ctr" rotWithShape="0">
                     <a:schemeClr val="bg2"/>
@@ -8012,7 +8012,7 @@
           <a:noFill/>
           <a:extLst>
             <a:ext uri="{909E8E84-426E-40dd-AFC4-6F175D3DCCD1}">
-              <a14:hiddenFill xmlns:a14="http://schemas.microsoft.com/office/drawing/2010/main" xmlns="">
+              <a14:hiddenFill xmlns="" xmlns:a14="http://schemas.microsoft.com/office/drawing/2010/main">
                 <a:solidFill>
                   <a:srgbClr val="FFFFFF"/>
                 </a:solidFill>
@@ -8123,7 +8123,7 @@
           <a:p>
             <a:r>
               <a:rPr lang="en-US"/>
-              <a:t>Copyright © 2020 Prime Lessons (primelessons.org) CC-BY-NC-SA.  (Last edit: 12/14/2020)</a:t>
+              <a:t>Copyright © 2023 Prime Lessons (primelessons.org) CC-BY-NC-SA.  (Last edit: 05/11/2023)</a:t>
             </a:r>
           </a:p>
         </p:txBody>
@@ -8356,7 +8356,7 @@
           <a:p>
             <a:r>
               <a:rPr lang="en-US"/>
-              <a:t>Copyright © 2020 Prime Lessons (primelessons.org) CC-BY-NC-SA.  (Last edit: 12/14/2020)</a:t>
+              <a:t>Copyright © 2023 Prime Lessons (primelessons.org) CC-BY-NC-SA.  (Last edit: 05/11/2023)</a:t>
             </a:r>
           </a:p>
         </p:txBody>
@@ -8659,7 +8659,7 @@
           <a:p>
             <a:r>
               <a:rPr lang="en-US"/>
-              <a:t>Copyright © 2020 Prime Lessons (primelessons.org) CC-BY-NC-SA.  (Last edit: 12/14/2020)</a:t>
+              <a:t>Copyright © 2023 Prime Lessons (primelessons.org) CC-BY-NC-SA.  (Last edit: 05/11/2023)</a:t>
             </a:r>
             <a:endParaRPr lang="en-US" dirty="0"/>
           </a:p>
@@ -8696,10 +8696,10 @@
       </p:sp>
       <p:pic>
         <p:nvPicPr>
-          <p:cNvPr id="8" name="Picture 7" descr="A screenshot of a cell phone&#10;&#10;Description automatically generated">
-            <a:extLst>
-              <a:ext uri="{FF2B5EF4-FFF2-40B4-BE49-F238E27FC236}">
-                <a16:creationId xmlns:a16="http://schemas.microsoft.com/office/drawing/2014/main" id="{8211FEFB-F55D-4F54-BF06-7AD19BE0F78E}"/>
+          <p:cNvPr id="7" name="Picture 6" descr="Text, letter&#10;&#10;Description automatically generated">
+            <a:extLst>
+              <a:ext uri="{FF2B5EF4-FFF2-40B4-BE49-F238E27FC236}">
+                <a16:creationId xmlns:a16="http://schemas.microsoft.com/office/drawing/2014/main" id="{5A50A695-5618-3641-BBAF-5ABA5BBC55D7}"/>
               </a:ext>
             </a:extLst>
           </p:cNvPr>
@@ -8716,8 +8716,8 @@
         </p:blipFill>
         <p:spPr>
           <a:xfrm>
-            <a:off x="5538522" y="3963629"/>
-            <a:ext cx="3226475" cy="1623921"/>
+            <a:off x="5262709" y="3890452"/>
+            <a:ext cx="2321432" cy="2036344"/>
           </a:xfrm>
           <a:prstGeom prst="rect">
             <a:avLst/>
@@ -8731,10 +8731,10 @@
       </p:pic>
       <p:pic>
         <p:nvPicPr>
-          <p:cNvPr id="7" name="Picture 6" descr="Text, letter&#10;&#10;Description automatically generated">
-            <a:extLst>
-              <a:ext uri="{FF2B5EF4-FFF2-40B4-BE49-F238E27FC236}">
-                <a16:creationId xmlns:a16="http://schemas.microsoft.com/office/drawing/2014/main" id="{5A50A695-5618-3641-BBAF-5ABA5BBC55D7}"/>
+          <p:cNvPr id="9" name="Picture 8" descr="A screenshot of a computer&#10;&#10;Description automatically generated with medium confidence">
+            <a:extLst>
+              <a:ext uri="{FF2B5EF4-FFF2-40B4-BE49-F238E27FC236}">
+                <a16:creationId xmlns:a16="http://schemas.microsoft.com/office/drawing/2014/main" id="{9338DC4D-CEAB-AF53-40C7-98E8EF828016}"/>
               </a:ext>
             </a:extLst>
           </p:cNvPr>
@@ -8751,43 +8751,8 @@
         </p:blipFill>
         <p:spPr>
           <a:xfrm>
-            <a:off x="3062679" y="3926208"/>
-            <a:ext cx="2234001" cy="1959650"/>
-          </a:xfrm>
-          <a:prstGeom prst="rect">
-            <a:avLst/>
-          </a:prstGeom>
-          <a:ln>
-            <a:solidFill>
-              <a:schemeClr val="tx1"/>
-            </a:solidFill>
-          </a:ln>
-        </p:spPr>
-      </p:pic>
-      <p:pic>
-        <p:nvPicPr>
-          <p:cNvPr id="10" name="Picture 9" descr="Graphical user interface, text, application, email&#10;&#10;Description automatically generated">
-            <a:extLst>
-              <a:ext uri="{FF2B5EF4-FFF2-40B4-BE49-F238E27FC236}">
-                <a16:creationId xmlns:a16="http://schemas.microsoft.com/office/drawing/2014/main" id="{964FAA16-6B0D-E041-8007-8826B0B41D96}"/>
-              </a:ext>
-            </a:extLst>
-          </p:cNvPr>
-          <p:cNvPicPr>
-            <a:picLocks noChangeAspect="1"/>
-          </p:cNvPicPr>
-          <p:nvPr/>
-        </p:nvPicPr>
-        <p:blipFill>
-          <a:blip r:embed="rId6"/>
-          <a:stretch>
-            <a:fillRect/>
-          </a:stretch>
-        </p:blipFill>
-        <p:spPr>
-          <a:xfrm>
-            <a:off x="422275" y="3963629"/>
-            <a:ext cx="2302060" cy="2085308"/>
+            <a:off x="927023" y="3890452"/>
+            <a:ext cx="4031972" cy="2031328"/>
           </a:xfrm>
           <a:prstGeom prst="rect">
             <a:avLst/>
@@ -8971,7 +8936,7 @@
           <a:p>
             <a:r>
               <a:rPr lang="en-US"/>
-              <a:t>Copyright © 2020 Prime Lessons (primelessons.org) CC-BY-NC-SA.  (Last edit: 12/14/2020)</a:t>
+              <a:t>Copyright © 2023 Prime Lessons (primelessons.org) CC-BY-NC-SA.  (Last edit: 05/11/2023)</a:t>
             </a:r>
             <a:endParaRPr lang="en-US" dirty="0"/>
           </a:p>
@@ -9683,7 +9648,7 @@
           <a:p>
             <a:r>
               <a:rPr lang="en-US"/>
-              <a:t>Copyright © 2020 Prime Lessons (primelessons.org) CC-BY-NC-SA.  (Last edit: 12/14/2020)</a:t>
+              <a:t>Copyright © 2023 Prime Lessons (primelessons.org) CC-BY-NC-SA.  (Last edit: 05/11/2023)</a:t>
             </a:r>
             <a:endParaRPr lang="en-US" dirty="0"/>
           </a:p>
@@ -9989,7 +9954,7 @@
           <a:p>
             <a:r>
               <a:rPr lang="en-US"/>
-              <a:t>Copyright © 2020 Prime Lessons (primelessons.org) CC-BY-NC-SA.  (Last edit: 12/14/2020)</a:t>
+              <a:t>Copyright © 2023 Prime Lessons (primelessons.org) CC-BY-NC-SA.  (Last edit: 05/11/2023)</a:t>
             </a:r>
             <a:endParaRPr lang="en-US" dirty="0"/>
           </a:p>
@@ -10308,7 +10273,7 @@
           <a:p>
             <a:r>
               <a:rPr lang="en-US"/>
-              <a:t>Copyright © 2020 Prime Lessons (primelessons.org) CC-BY-NC-SA.  (Last edit: 12/14/2020)</a:t>
+              <a:t>Copyright © 2023 Prime Lessons (primelessons.org) CC-BY-NC-SA.  (Last edit: 05/11/2023)</a:t>
             </a:r>
             <a:endParaRPr lang="en-US" dirty="0"/>
           </a:p>
@@ -10762,7 +10727,7 @@
           <a:p>
             <a:r>
               <a:rPr lang="en-US"/>
-              <a:t>Copyright © 2020 Prime Lessons (primelessons.org) CC-BY-NC-SA.  (Last edit: 12/14/2020)</a:t>
+              <a:t>Copyright © 2023 Prime Lessons (primelessons.org) CC-BY-NC-SA.  (Last edit: 05/11/2023)</a:t>
             </a:r>
             <a:endParaRPr lang="en-US" dirty="0"/>
           </a:p>

</xml_diff>

<commit_message>
Updated screenshots for Unit 1 lessons
</commit_message>
<xml_diff>
--- a/en/ProgrammingLessons/SoftwareandFirmware.pptx
+++ b/en/ProgrammingLessons/SoftwareandFirmware.pptx
@@ -220,7 +220,7 @@
           <a:p>
             <a:fld id="{58040048-1E4D-CD41-AC49-0750EB72586B}" type="datetimeFigureOut">
               <a:rPr lang="en-US" smtClean="0"/>
-              <a:t>5/11/23</a:t>
+              <a:t>5/12/23</a:t>
             </a:fld>
             <a:endParaRPr lang="en-US"/>
           </a:p>
@@ -386,7 +386,7 @@
           <a:p>
             <a:fld id="{2B8484CF-5098-F24E-8881-583515D5C406}" type="datetimeFigureOut">
               <a:rPr lang="en-US" smtClean="0"/>
-              <a:t>5/11/23</a:t>
+              <a:t>5/12/23</a:t>
             </a:fld>
             <a:endParaRPr lang="en-US"/>
           </a:p>
@@ -7661,7 +7661,7 @@
           <a:effectLst/>
           <a:extLst>
             <a:ext uri="{91240B29-F687-4f45-9708-019B960494DF}">
-              <a14:hiddenLine xmlns="" xmlns:a14="http://schemas.microsoft.com/office/drawing/2010/main" w="9525">
+              <a14:hiddenLine xmlns:a14="http://schemas.microsoft.com/office/drawing/2010/main" xmlns="" w="9525">
                 <a:solidFill>
                   <a:schemeClr val="tx1"/>
                 </a:solidFill>
@@ -7671,7 +7671,7 @@
               </a14:hiddenLine>
             </a:ext>
             <a:ext uri="{AF507438-7753-43e0-B8FC-AC1667EBCBE1}">
-              <a14:hiddenEffects xmlns="" xmlns:a14="http://schemas.microsoft.com/office/drawing/2010/main">
+              <a14:hiddenEffects xmlns:a14="http://schemas.microsoft.com/office/drawing/2010/main" xmlns="">
                 <a:effectLst>
                   <a:outerShdw dist="35921" dir="2700000" algn="ctr" rotWithShape="0">
                     <a:schemeClr val="bg2"/>
@@ -8012,7 +8012,7 @@
           <a:noFill/>
           <a:extLst>
             <a:ext uri="{909E8E84-426E-40dd-AFC4-6F175D3DCCD1}">
-              <a14:hiddenFill xmlns="" xmlns:a14="http://schemas.microsoft.com/office/drawing/2010/main">
+              <a14:hiddenFill xmlns:a14="http://schemas.microsoft.com/office/drawing/2010/main" xmlns="">
                 <a:solidFill>
                   <a:srgbClr val="FFFFFF"/>
                 </a:solidFill>
@@ -8249,10 +8249,10 @@
       </p:grpSpPr>
       <p:pic>
         <p:nvPicPr>
-          <p:cNvPr id="5" name="Picture 4">
-            <a:extLst>
-              <a:ext uri="{FF2B5EF4-FFF2-40B4-BE49-F238E27FC236}">
-                <a16:creationId xmlns:a16="http://schemas.microsoft.com/office/drawing/2014/main" id="{FA399B84-BCC1-4BA3-B95D-5928C70046E0}"/>
+          <p:cNvPr id="8" name="Picture 7" descr="A screenshot of a chat&#10;&#10;Description automatically generated with medium confidence">
+            <a:extLst>
+              <a:ext uri="{FF2B5EF4-FFF2-40B4-BE49-F238E27FC236}">
+                <a16:creationId xmlns:a16="http://schemas.microsoft.com/office/drawing/2014/main" id="{2F2BDC34-EC11-AF89-D1C8-23676EC9B493}"/>
               </a:ext>
             </a:extLst>
           </p:cNvPr>
@@ -8261,15 +8261,16 @@
           </p:cNvPicPr>
           <p:nvPr/>
         </p:nvPicPr>
-        <p:blipFill rotWithShape="1">
+        <p:blipFill>
           <a:blip r:embed="rId2"/>
-          <a:srcRect t="4720"/>
-          <a:stretch/>
+          <a:stretch>
+            <a:fillRect/>
+          </a:stretch>
         </p:blipFill>
         <p:spPr>
           <a:xfrm>
-            <a:off x="159493" y="1177853"/>
-            <a:ext cx="3144028" cy="2251147"/>
+            <a:off x="137439" y="1201521"/>
+            <a:ext cx="3188135" cy="2642221"/>
           </a:xfrm>
           <a:prstGeom prst="rect">
             <a:avLst/>
@@ -8398,7 +8399,7 @@
         </p:nvSpPr>
         <p:spPr>
           <a:xfrm>
-            <a:off x="1143862" y="1323609"/>
+            <a:off x="1104952" y="1323609"/>
             <a:ext cx="325641" cy="312615"/>
           </a:xfrm>
           <a:prstGeom prst="rect">
@@ -8456,7 +8457,7 @@
         </p:blipFill>
         <p:spPr>
           <a:xfrm>
-            <a:off x="137439" y="3568431"/>
+            <a:off x="137439" y="3529517"/>
             <a:ext cx="3188135" cy="2679656"/>
           </a:xfrm>
           <a:prstGeom prst="rect">
@@ -8794,66 +8795,6 @@
           <a:chExt cx="0" cy="0"/>
         </a:xfrm>
       </p:grpSpPr>
-      <p:pic>
-        <p:nvPicPr>
-          <p:cNvPr id="16" name="Picture 15">
-            <a:extLst>
-              <a:ext uri="{FF2B5EF4-FFF2-40B4-BE49-F238E27FC236}">
-                <a16:creationId xmlns:a16="http://schemas.microsoft.com/office/drawing/2014/main" id="{2AEF66B6-E8AF-8046-BB6A-939991D8BE03}"/>
-              </a:ext>
-            </a:extLst>
-          </p:cNvPr>
-          <p:cNvPicPr>
-            <a:picLocks noChangeAspect="1"/>
-          </p:cNvPicPr>
-          <p:nvPr/>
-        </p:nvPicPr>
-        <p:blipFill>
-          <a:blip r:embed="rId2"/>
-          <a:stretch>
-            <a:fillRect/>
-          </a:stretch>
-        </p:blipFill>
-        <p:spPr>
-          <a:xfrm>
-            <a:off x="219004" y="2318415"/>
-            <a:ext cx="3155057" cy="2374011"/>
-          </a:xfrm>
-          <a:prstGeom prst="rect">
-            <a:avLst/>
-          </a:prstGeom>
-        </p:spPr>
-      </p:pic>
-      <p:pic>
-        <p:nvPicPr>
-          <p:cNvPr id="15" name="Picture 14" descr="Graphical user interface, application, Teams&#10;&#10;Description automatically generated">
-            <a:extLst>
-              <a:ext uri="{FF2B5EF4-FFF2-40B4-BE49-F238E27FC236}">
-                <a16:creationId xmlns:a16="http://schemas.microsoft.com/office/drawing/2014/main" id="{8FE097C0-DD19-764D-8E47-265A7CF4E28F}"/>
-              </a:ext>
-            </a:extLst>
-          </p:cNvPr>
-          <p:cNvPicPr>
-            <a:picLocks noChangeAspect="1"/>
-          </p:cNvPicPr>
-          <p:nvPr/>
-        </p:nvPicPr>
-        <p:blipFill>
-          <a:blip r:embed="rId3"/>
-          <a:stretch>
-            <a:fillRect/>
-          </a:stretch>
-        </p:blipFill>
-        <p:spPr>
-          <a:xfrm>
-            <a:off x="1796533" y="3058161"/>
-            <a:ext cx="3289107" cy="2478094"/>
-          </a:xfrm>
-          <a:prstGeom prst="rect">
-            <a:avLst/>
-          </a:prstGeom>
-        </p:spPr>
-      </p:pic>
       <p:sp>
         <p:nvSpPr>
           <p:cNvPr id="2" name="Title 1">
@@ -8884,35 +8825,6 @@
           </a:p>
         </p:txBody>
       </p:sp>
-      <p:pic>
-        <p:nvPicPr>
-          <p:cNvPr id="7" name="Content Placeholder 6">
-            <a:extLst>
-              <a:ext uri="{FF2B5EF4-FFF2-40B4-BE49-F238E27FC236}">
-                <a16:creationId xmlns:a16="http://schemas.microsoft.com/office/drawing/2014/main" id="{50A327FA-9BE3-4B4B-90E9-EB2DAC8209B9}"/>
-              </a:ext>
-            </a:extLst>
-          </p:cNvPr>
-          <p:cNvPicPr>
-            <a:picLocks noGrp="1" noChangeAspect="1"/>
-          </p:cNvPicPr>
-          <p:nvPr>
-            <p:ph idx="1"/>
-          </p:nvPr>
-        </p:nvPicPr>
-        <p:blipFill>
-          <a:blip r:embed="rId4"/>
-          <a:stretch>
-            <a:fillRect/>
-          </a:stretch>
-        </p:blipFill>
-        <p:spPr>
-          <a:xfrm>
-            <a:off x="5313680" y="2452384"/>
-            <a:ext cx="3466204" cy="2939593"/>
-          </a:xfrm>
-        </p:spPr>
-      </p:pic>
       <p:sp>
         <p:nvSpPr>
           <p:cNvPr id="4" name="Footer Placeholder 3">
@@ -8985,7 +8897,7 @@
         </p:nvSpPr>
         <p:spPr>
           <a:xfrm>
-            <a:off x="872015" y="5781527"/>
+            <a:off x="440900" y="5723600"/>
             <a:ext cx="2698985" cy="369332"/>
           </a:xfrm>
           <a:prstGeom prst="rect">
@@ -9040,106 +8952,6 @@
               <a:rPr lang="en-US" dirty="0"/>
               <a:t>Robot Inventor</a:t>
             </a:r>
-          </a:p>
-        </p:txBody>
-      </p:sp>
-      <p:sp>
-        <p:nvSpPr>
-          <p:cNvPr id="10" name="Rectangle 9">
-            <a:extLst>
-              <a:ext uri="{FF2B5EF4-FFF2-40B4-BE49-F238E27FC236}">
-                <a16:creationId xmlns:a16="http://schemas.microsoft.com/office/drawing/2014/main" id="{44BC46E5-4160-CC4D-A38B-59307170439D}"/>
-              </a:ext>
-            </a:extLst>
-          </p:cNvPr>
-          <p:cNvSpPr/>
-          <p:nvPr/>
-        </p:nvSpPr>
-        <p:spPr>
-          <a:xfrm>
-            <a:off x="1967248" y="5346276"/>
-            <a:ext cx="491472" cy="312615"/>
-          </a:xfrm>
-          <a:prstGeom prst="rect">
-            <a:avLst/>
-          </a:prstGeom>
-          <a:noFill/>
-          <a:ln w="57150" cmpd="sng">
-            <a:solidFill>
-              <a:srgbClr val="FFD500"/>
-            </a:solidFill>
-          </a:ln>
-        </p:spPr>
-        <p:style>
-          <a:lnRef idx="1">
-            <a:schemeClr val="accent1"/>
-          </a:lnRef>
-          <a:fillRef idx="3">
-            <a:schemeClr val="accent1"/>
-          </a:fillRef>
-          <a:effectRef idx="2">
-            <a:schemeClr val="accent1"/>
-          </a:effectRef>
-          <a:fontRef idx="minor">
-            <a:schemeClr val="lt1"/>
-          </a:fontRef>
-        </p:style>
-        <p:txBody>
-          <a:bodyPr rtlCol="0" anchor="ctr"/>
-          <a:lstStyle/>
-          <a:p>
-            <a:pPr algn="ctr"/>
-            <a:endParaRPr lang="en-US"/>
-          </a:p>
-        </p:txBody>
-      </p:sp>
-      <p:sp>
-        <p:nvSpPr>
-          <p:cNvPr id="11" name="Rectangle 10">
-            <a:extLst>
-              <a:ext uri="{FF2B5EF4-FFF2-40B4-BE49-F238E27FC236}">
-                <a16:creationId xmlns:a16="http://schemas.microsoft.com/office/drawing/2014/main" id="{5EC3BC63-F93E-3144-9F0E-5E07E216E6FE}"/>
-              </a:ext>
-            </a:extLst>
-          </p:cNvPr>
-          <p:cNvSpPr/>
-          <p:nvPr/>
-        </p:nvSpPr>
-        <p:spPr>
-          <a:xfrm>
-            <a:off x="5313680" y="4697879"/>
-            <a:ext cx="558800" cy="312615"/>
-          </a:xfrm>
-          <a:prstGeom prst="rect">
-            <a:avLst/>
-          </a:prstGeom>
-          <a:noFill/>
-          <a:ln w="57150" cmpd="sng">
-            <a:solidFill>
-              <a:srgbClr val="0EAE9F"/>
-            </a:solidFill>
-          </a:ln>
-        </p:spPr>
-        <p:style>
-          <a:lnRef idx="1">
-            <a:schemeClr val="accent1"/>
-          </a:lnRef>
-          <a:fillRef idx="3">
-            <a:schemeClr val="accent1"/>
-          </a:fillRef>
-          <a:effectRef idx="2">
-            <a:schemeClr val="accent1"/>
-          </a:effectRef>
-          <a:fontRef idx="minor">
-            <a:schemeClr val="lt1"/>
-          </a:fontRef>
-        </p:style>
-        <p:txBody>
-          <a:bodyPr rtlCol="0" anchor="ctr"/>
-          <a:lstStyle/>
-          <a:p>
-            <a:pPr algn="ctr"/>
-            <a:endParaRPr lang="en-US"/>
           </a:p>
         </p:txBody>
       </p:sp>
@@ -9373,23 +9185,83 @@
           <a:p>
             <a:r>
               <a:rPr lang="en-US" dirty="0"/>
-              <a:t>In SPIKE Prime, the version is at the top of all screens.  You can also click on the gear icon on the top right of the home screen to access the Settings page.</a:t>
+              <a:t>In SPIKE, Click on the SPIKE button and select About </a:t>
             </a:r>
           </a:p>
           <a:p>
             <a:r>
               <a:rPr lang="en-US" dirty="0"/>
-              <a:t>In Robot Inventor, click on Settings at the bottom of the home screen</a:t>
-            </a:r>
-          </a:p>
-        </p:txBody>
-      </p:sp>
-      <p:sp>
-        <p:nvSpPr>
-          <p:cNvPr id="13" name="Rectangle 12">
-            <a:extLst>
-              <a:ext uri="{FF2B5EF4-FFF2-40B4-BE49-F238E27FC236}">
-                <a16:creationId xmlns:a16="http://schemas.microsoft.com/office/drawing/2014/main" id="{C0E4B517-5AF2-8745-BA0D-B404EB8D84B5}"/>
+              <a:t>In Robot Inventor, click on MINDSTORMS at select About</a:t>
+            </a:r>
+          </a:p>
+        </p:txBody>
+      </p:sp>
+      <p:pic>
+        <p:nvPicPr>
+          <p:cNvPr id="6" name="Picture 5" descr="A screenshot of a phone&#10;&#10;Description automatically generated with medium confidence">
+            <a:extLst>
+              <a:ext uri="{FF2B5EF4-FFF2-40B4-BE49-F238E27FC236}">
+                <a16:creationId xmlns:a16="http://schemas.microsoft.com/office/drawing/2014/main" id="{0EF07D37-CB03-E173-B8E4-E1BF1F4CF58F}"/>
+              </a:ext>
+            </a:extLst>
+          </p:cNvPr>
+          <p:cNvPicPr>
+            <a:picLocks noChangeAspect="1"/>
+          </p:cNvPicPr>
+          <p:nvPr/>
+        </p:nvPicPr>
+        <p:blipFill>
+          <a:blip r:embed="rId2"/>
+          <a:stretch>
+            <a:fillRect/>
+          </a:stretch>
+        </p:blipFill>
+        <p:spPr>
+          <a:xfrm>
+            <a:off x="175261" y="2134104"/>
+            <a:ext cx="2082800" cy="2552700"/>
+          </a:xfrm>
+          <a:prstGeom prst="rect">
+            <a:avLst/>
+          </a:prstGeom>
+        </p:spPr>
+      </p:pic>
+      <p:pic>
+        <p:nvPicPr>
+          <p:cNvPr id="19" name="Picture 18" descr="A screenshot of a phone&#10;&#10;Description automatically generated with medium confidence">
+            <a:extLst>
+              <a:ext uri="{FF2B5EF4-FFF2-40B4-BE49-F238E27FC236}">
+                <a16:creationId xmlns:a16="http://schemas.microsoft.com/office/drawing/2014/main" id="{6962D7C7-7452-705A-37DA-9E2A1B1E92E6}"/>
+              </a:ext>
+            </a:extLst>
+          </p:cNvPr>
+          <p:cNvPicPr>
+            <a:picLocks noChangeAspect="1"/>
+          </p:cNvPicPr>
+          <p:nvPr/>
+        </p:nvPicPr>
+        <p:blipFill>
+          <a:blip r:embed="rId3"/>
+          <a:stretch>
+            <a:fillRect/>
+          </a:stretch>
+        </p:blipFill>
+        <p:spPr>
+          <a:xfrm>
+            <a:off x="1912347" y="3662094"/>
+            <a:ext cx="2839863" cy="1999181"/>
+          </a:xfrm>
+          <a:prstGeom prst="rect">
+            <a:avLst/>
+          </a:prstGeom>
+        </p:spPr>
+      </p:pic>
+      <p:sp>
+        <p:nvSpPr>
+          <p:cNvPr id="10" name="Rectangle 9">
+            <a:extLst>
+              <a:ext uri="{FF2B5EF4-FFF2-40B4-BE49-F238E27FC236}">
+                <a16:creationId xmlns:a16="http://schemas.microsoft.com/office/drawing/2014/main" id="{44BC46E5-4160-CC4D-A38B-59307170439D}"/>
               </a:ext>
             </a:extLst>
           </p:cNvPr>
@@ -9398,8 +9270,8 @@
         </p:nvSpPr>
         <p:spPr>
           <a:xfrm>
-            <a:off x="7016302" y="5010494"/>
-            <a:ext cx="558800" cy="312615"/>
+            <a:off x="175260" y="2410897"/>
+            <a:ext cx="2082800" cy="374254"/>
           </a:xfrm>
           <a:prstGeom prst="rect">
             <a:avLst/>
@@ -9407,7 +9279,7 @@
           <a:noFill/>
           <a:ln w="57150" cmpd="sng">
             <a:solidFill>
-              <a:srgbClr val="0EAE9F"/>
+              <a:srgbClr val="FFD500"/>
             </a:solidFill>
           </a:ln>
         </p:spPr>
@@ -9434,12 +9306,42 @@
           </a:p>
         </p:txBody>
       </p:sp>
-      <p:sp>
-        <p:nvSpPr>
-          <p:cNvPr id="17" name="Rectangle 16">
-            <a:extLst>
-              <a:ext uri="{FF2B5EF4-FFF2-40B4-BE49-F238E27FC236}">
-                <a16:creationId xmlns:a16="http://schemas.microsoft.com/office/drawing/2014/main" id="{A6B7E7C7-176D-8B44-9699-9B5D50757F88}"/>
+      <p:pic>
+        <p:nvPicPr>
+          <p:cNvPr id="25" name="Picture 24" descr="A screenshot of a phone&#10;&#10;Description automatically generated with medium confidence">
+            <a:extLst>
+              <a:ext uri="{FF2B5EF4-FFF2-40B4-BE49-F238E27FC236}">
+                <a16:creationId xmlns:a16="http://schemas.microsoft.com/office/drawing/2014/main" id="{951B86DC-E227-F1A0-7F13-1D77936A8F45}"/>
+              </a:ext>
+            </a:extLst>
+          </p:cNvPr>
+          <p:cNvPicPr>
+            <a:picLocks noChangeAspect="1"/>
+          </p:cNvPicPr>
+          <p:nvPr/>
+        </p:nvPicPr>
+        <p:blipFill>
+          <a:blip r:embed="rId4"/>
+          <a:stretch>
+            <a:fillRect/>
+          </a:stretch>
+        </p:blipFill>
+        <p:spPr>
+          <a:xfrm>
+            <a:off x="4958994" y="2222116"/>
+            <a:ext cx="2768600" cy="2527300"/>
+          </a:xfrm>
+          <a:prstGeom prst="rect">
+            <a:avLst/>
+          </a:prstGeom>
+        </p:spPr>
+      </p:pic>
+      <p:sp>
+        <p:nvSpPr>
+          <p:cNvPr id="11" name="Rectangle 10">
+            <a:extLst>
+              <a:ext uri="{FF2B5EF4-FFF2-40B4-BE49-F238E27FC236}">
+                <a16:creationId xmlns:a16="http://schemas.microsoft.com/office/drawing/2014/main" id="{5EC3BC63-F93E-3144-9F0E-5E07E216E6FE}"/>
               </a:ext>
             </a:extLst>
           </p:cNvPr>
@@ -9448,8 +9350,8 @@
         </p:nvSpPr>
         <p:spPr>
           <a:xfrm>
-            <a:off x="1399509" y="2215501"/>
-            <a:ext cx="821998" cy="312615"/>
+            <a:off x="4960172" y="2563943"/>
+            <a:ext cx="2767422" cy="312615"/>
           </a:xfrm>
           <a:prstGeom prst="rect">
             <a:avLst/>
@@ -9457,7 +9359,7 @@
           <a:noFill/>
           <a:ln w="57150" cmpd="sng">
             <a:solidFill>
-              <a:srgbClr val="FFD500"/>
+              <a:srgbClr val="0EAE9F"/>
             </a:solidFill>
           </a:ln>
         </p:spPr>
@@ -9484,56 +9386,36 @@
           </a:p>
         </p:txBody>
       </p:sp>
-      <p:sp>
-        <p:nvSpPr>
-          <p:cNvPr id="18" name="Rectangle 17">
-            <a:extLst>
-              <a:ext uri="{FF2B5EF4-FFF2-40B4-BE49-F238E27FC236}">
-                <a16:creationId xmlns:a16="http://schemas.microsoft.com/office/drawing/2014/main" id="{5E76FF15-4A8E-0D48-9DF1-46AFC8E4BDBB}"/>
-              </a:ext>
-            </a:extLst>
-          </p:cNvPr>
-          <p:cNvSpPr/>
+      <p:pic>
+        <p:nvPicPr>
+          <p:cNvPr id="24" name="Picture 23" descr="A screenshot of a phone&#10;&#10;Description automatically generated with medium confidence">
+            <a:extLst>
+              <a:ext uri="{FF2B5EF4-FFF2-40B4-BE49-F238E27FC236}">
+                <a16:creationId xmlns:a16="http://schemas.microsoft.com/office/drawing/2014/main" id="{5597DA95-A76D-494B-B7BE-4A0F6507B193}"/>
+              </a:ext>
+            </a:extLst>
+          </p:cNvPr>
+          <p:cNvPicPr>
+            <a:picLocks noChangeAspect="1"/>
+          </p:cNvPicPr>
           <p:nvPr/>
-        </p:nvSpPr>
-        <p:spPr>
-          <a:xfrm>
-            <a:off x="4846320" y="3092264"/>
-            <a:ext cx="239320" cy="312615"/>
+        </p:nvPicPr>
+        <p:blipFill>
+          <a:blip r:embed="rId5"/>
+          <a:stretch>
+            <a:fillRect/>
+          </a:stretch>
+        </p:blipFill>
+        <p:spPr>
+          <a:xfrm>
+            <a:off x="5971965" y="3662095"/>
+            <a:ext cx="2810778" cy="1926823"/>
           </a:xfrm>
           <a:prstGeom prst="rect">
             <a:avLst/>
           </a:prstGeom>
-          <a:noFill/>
-          <a:ln w="57150" cmpd="sng">
-            <a:solidFill>
-              <a:srgbClr val="FFD500"/>
-            </a:solidFill>
-          </a:ln>
-        </p:spPr>
-        <p:style>
-          <a:lnRef idx="1">
-            <a:schemeClr val="accent1"/>
-          </a:lnRef>
-          <a:fillRef idx="3">
-            <a:schemeClr val="accent1"/>
-          </a:fillRef>
-          <a:effectRef idx="2">
-            <a:schemeClr val="accent1"/>
-          </a:effectRef>
-          <a:fontRef idx="minor">
-            <a:schemeClr val="lt1"/>
-          </a:fontRef>
-        </p:style>
-        <p:txBody>
-          <a:bodyPr rtlCol="0" anchor="ctr"/>
-          <a:lstStyle/>
-          <a:p>
-            <a:pPr algn="ctr"/>
-            <a:endParaRPr lang="en-US"/>
-          </a:p>
-        </p:txBody>
-      </p:sp>
+        </p:spPr>
+      </p:pic>
     </p:spTree>
     <p:extLst>
       <p:ext uri="{BB962C8B-B14F-4D97-AF65-F5344CB8AC3E}">
@@ -9620,7 +9502,7 @@
           <a:p>
             <a:r>
               <a:rPr lang="en-US" dirty="0"/>
-              <a:t>If there is an Update for SPIKE Prime or Robot Inventor available, you will get a popup telling you to do so</a:t>
+              <a:t>If there is an Update for SPIKE Prime or Robot Inventor available, you will get a popup telling you to do s</a:t>
             </a:r>
           </a:p>
         </p:txBody>
@@ -9704,7 +9586,7 @@
         </p:blipFill>
         <p:spPr>
           <a:xfrm>
-            <a:off x="1172445" y="2087033"/>
+            <a:off x="1172445" y="2958403"/>
             <a:ext cx="2918460" cy="2179320"/>
           </a:xfrm>
           <a:prstGeom prst="rect">
@@ -9748,7 +9630,7 @@
         </p:blipFill>
         <p:spPr>
           <a:xfrm>
-            <a:off x="4675114" y="2033788"/>
+            <a:off x="4675114" y="2905158"/>
             <a:ext cx="3662801" cy="2232565"/>
           </a:xfrm>
           <a:prstGeom prst="rect">
@@ -9770,7 +9652,7 @@
         </p:nvSpPr>
         <p:spPr>
           <a:xfrm>
-            <a:off x="1172445" y="4360678"/>
+            <a:off x="1172445" y="5232048"/>
             <a:ext cx="2698985" cy="369332"/>
           </a:xfrm>
           <a:prstGeom prst="rect">
@@ -9806,7 +9688,7 @@
         </p:nvSpPr>
         <p:spPr>
           <a:xfrm>
-            <a:off x="5157021" y="4360678"/>
+            <a:off x="5272572" y="5232048"/>
             <a:ext cx="2698985" cy="369332"/>
           </a:xfrm>
           <a:prstGeom prst="rect">
@@ -10424,8 +10306,8 @@
         </p:nvSpPr>
         <p:spPr>
           <a:xfrm>
-            <a:off x="4979314" y="2691836"/>
-            <a:ext cx="1035406" cy="325120"/>
+            <a:off x="4873214" y="2691836"/>
+            <a:ext cx="1141506" cy="325120"/>
           </a:xfrm>
           <a:prstGeom prst="rect">
             <a:avLst/>

</xml_diff>